<commit_message>
Possible corruption of val change vs key repeat
</commit_message>
<xml_diff>
--- a/Dust_Data_Project.pptx
+++ b/Dust_Data_Project.pptx
@@ -30,6 +30,7 @@
     <p:sldId id="278" r:id="rId24"/>
     <p:sldId id="277" r:id="rId25"/>
     <p:sldId id="279" r:id="rId26"/>
+    <p:sldId id="281" r:id="rId27"/>
   </p:sldIdLst>
   <p:sldSz cx="12192000" cy="6858000"/>
   <p:notesSz cx="6858000" cy="9144000"/>
@@ -283,7 +284,7 @@
           <a:p>
             <a:fld id="{FE061E4A-4E32-4A9C-BF91-22E1DB7CF4C9}" type="datetimeFigureOut">
               <a:rPr lang="en-US" smtClean="0"/>
-              <a:t>7/29/2019</a:t>
+              <a:t>8/13/2019</a:t>
             </a:fld>
             <a:endParaRPr lang="en-US"/>
           </a:p>
@@ -481,7 +482,7 @@
           <a:p>
             <a:fld id="{FE061E4A-4E32-4A9C-BF91-22E1DB7CF4C9}" type="datetimeFigureOut">
               <a:rPr lang="en-US" smtClean="0"/>
-              <a:t>7/29/2019</a:t>
+              <a:t>8/13/2019</a:t>
             </a:fld>
             <a:endParaRPr lang="en-US"/>
           </a:p>
@@ -689,7 +690,7 @@
           <a:p>
             <a:fld id="{FE061E4A-4E32-4A9C-BF91-22E1DB7CF4C9}" type="datetimeFigureOut">
               <a:rPr lang="en-US" smtClean="0"/>
-              <a:t>7/29/2019</a:t>
+              <a:t>8/13/2019</a:t>
             </a:fld>
             <a:endParaRPr lang="en-US"/>
           </a:p>
@@ -887,7 +888,7 @@
           <a:p>
             <a:fld id="{FE061E4A-4E32-4A9C-BF91-22E1DB7CF4C9}" type="datetimeFigureOut">
               <a:rPr lang="en-US" smtClean="0"/>
-              <a:t>7/29/2019</a:t>
+              <a:t>8/13/2019</a:t>
             </a:fld>
             <a:endParaRPr lang="en-US"/>
           </a:p>
@@ -1162,7 +1163,7 @@
           <a:p>
             <a:fld id="{FE061E4A-4E32-4A9C-BF91-22E1DB7CF4C9}" type="datetimeFigureOut">
               <a:rPr lang="en-US" smtClean="0"/>
-              <a:t>7/29/2019</a:t>
+              <a:t>8/13/2019</a:t>
             </a:fld>
             <a:endParaRPr lang="en-US"/>
           </a:p>
@@ -1427,7 +1428,7 @@
           <a:p>
             <a:fld id="{FE061E4A-4E32-4A9C-BF91-22E1DB7CF4C9}" type="datetimeFigureOut">
               <a:rPr lang="en-US" smtClean="0"/>
-              <a:t>7/29/2019</a:t>
+              <a:t>8/13/2019</a:t>
             </a:fld>
             <a:endParaRPr lang="en-US"/>
           </a:p>
@@ -1839,7 +1840,7 @@
           <a:p>
             <a:fld id="{FE061E4A-4E32-4A9C-BF91-22E1DB7CF4C9}" type="datetimeFigureOut">
               <a:rPr lang="en-US" smtClean="0"/>
-              <a:t>7/29/2019</a:t>
+              <a:t>8/13/2019</a:t>
             </a:fld>
             <a:endParaRPr lang="en-US"/>
           </a:p>
@@ -1980,7 +1981,7 @@
           <a:p>
             <a:fld id="{FE061E4A-4E32-4A9C-BF91-22E1DB7CF4C9}" type="datetimeFigureOut">
               <a:rPr lang="en-US" smtClean="0"/>
-              <a:t>7/29/2019</a:t>
+              <a:t>8/13/2019</a:t>
             </a:fld>
             <a:endParaRPr lang="en-US"/>
           </a:p>
@@ -2093,7 +2094,7 @@
           <a:p>
             <a:fld id="{FE061E4A-4E32-4A9C-BF91-22E1DB7CF4C9}" type="datetimeFigureOut">
               <a:rPr lang="en-US" smtClean="0"/>
-              <a:t>7/29/2019</a:t>
+              <a:t>8/13/2019</a:t>
             </a:fld>
             <a:endParaRPr lang="en-US"/>
           </a:p>
@@ -2404,7 +2405,7 @@
           <a:p>
             <a:fld id="{FE061E4A-4E32-4A9C-BF91-22E1DB7CF4C9}" type="datetimeFigureOut">
               <a:rPr lang="en-US" smtClean="0"/>
-              <a:t>7/29/2019</a:t>
+              <a:t>8/13/2019</a:t>
             </a:fld>
             <a:endParaRPr lang="en-US"/>
           </a:p>
@@ -2692,7 +2693,7 @@
           <a:p>
             <a:fld id="{FE061E4A-4E32-4A9C-BF91-22E1DB7CF4C9}" type="datetimeFigureOut">
               <a:rPr lang="en-US" smtClean="0"/>
-              <a:t>7/29/2019</a:t>
+              <a:t>8/13/2019</a:t>
             </a:fld>
             <a:endParaRPr lang="en-US"/>
           </a:p>
@@ -2933,7 +2934,7 @@
           <a:p>
             <a:fld id="{FE061E4A-4E32-4A9C-BF91-22E1DB7CF4C9}" type="datetimeFigureOut">
               <a:rPr lang="en-US" smtClean="0"/>
-              <a:t>7/29/2019</a:t>
+              <a:t>8/13/2019</a:t>
             </a:fld>
             <a:endParaRPr lang="en-US"/>
           </a:p>
@@ -14656,33 +14657,1441 @@
           </a:p>
         </p:txBody>
       </p:sp>
-      <p:sp>
-        <p:nvSpPr>
-          <p:cNvPr id="3" name="Content Placeholder 2">
-            <a:extLst>
-              <a:ext uri="{FF2B5EF4-FFF2-40B4-BE49-F238E27FC236}">
-                <a16:creationId xmlns:a16="http://schemas.microsoft.com/office/drawing/2014/main" id="{BC03EF23-DD57-409E-9D46-B3D1276F52D8}"/>
-              </a:ext>
-            </a:extLst>
-          </p:cNvPr>
-          <p:cNvSpPr>
-            <a:spLocks noGrp="1"/>
-          </p:cNvSpPr>
-          <p:nvPr>
-            <p:ph idx="1"/>
-          </p:nvPr>
-        </p:nvSpPr>
-        <p:spPr/>
-        <p:txBody>
-          <a:bodyPr/>
-          <a:lstStyle/>
-          <a:p>
-            <a:pPr marL="0" indent="0">
-              <a:buNone/>
-            </a:pPr>
+      <p:pic>
+        <p:nvPicPr>
+          <p:cNvPr id="4" name="Picture 3">
+            <a:extLst>
+              <a:ext uri="{FF2B5EF4-FFF2-40B4-BE49-F238E27FC236}">
+                <a16:creationId xmlns:a16="http://schemas.microsoft.com/office/drawing/2014/main" id="{691E7709-2C82-4BA4-A22A-944A46261143}"/>
+              </a:ext>
+            </a:extLst>
+          </p:cNvPr>
+          <p:cNvPicPr>
+            <a:picLocks noChangeAspect="1"/>
+          </p:cNvPicPr>
+          <p:nvPr/>
+        </p:nvPicPr>
+        <p:blipFill>
+          <a:blip r:embed="rId2"/>
+          <a:stretch>
+            <a:fillRect/>
+          </a:stretch>
+        </p:blipFill>
+        <p:spPr>
+          <a:xfrm>
+            <a:off x="4558321" y="1504562"/>
+            <a:ext cx="6766938" cy="4740595"/>
+          </a:xfrm>
+          <a:prstGeom prst="rect">
+            <a:avLst/>
+          </a:prstGeom>
+        </p:spPr>
+      </p:pic>
+      <p:sp>
+        <p:nvSpPr>
+          <p:cNvPr id="6" name="TextBox 5">
+            <a:extLst>
+              <a:ext uri="{FF2B5EF4-FFF2-40B4-BE49-F238E27FC236}">
+                <a16:creationId xmlns:a16="http://schemas.microsoft.com/office/drawing/2014/main" id="{F1D5B3A2-36AF-4E3C-964D-865FE0515B00}"/>
+              </a:ext>
+            </a:extLst>
+          </p:cNvPr>
+          <p:cNvSpPr txBox="1"/>
+          <p:nvPr/>
+        </p:nvSpPr>
+        <p:spPr>
+          <a:xfrm>
+            <a:off x="838200" y="3413194"/>
+            <a:ext cx="3439486" cy="923330"/>
+          </a:xfrm>
+          <a:prstGeom prst="rect">
+            <a:avLst/>
+          </a:prstGeom>
+          <a:noFill/>
+        </p:spPr>
+        <p:txBody>
+          <a:bodyPr wrap="square" rtlCol="0">
+            <a:spAutoFit/>
+          </a:bodyPr>
+          <a:lstStyle/>
+          <a:p>
             <a:r>
               <a:rPr lang="en-US" dirty="0"/>
-              <a:t>Comparison to an “expected” mean session</a:t>
+              <a:t>Session</a:t>
+            </a:r>
+          </a:p>
+          <a:p>
+            <a:r>
+              <a:rPr lang="en-US" dirty="0"/>
+              <a:t>445 dust events in 2 hours</a:t>
+            </a:r>
+          </a:p>
+          <a:p>
+            <a:r>
+              <a:rPr lang="en-US" dirty="0"/>
+              <a:t>5km/s – 30km/s</a:t>
+            </a:r>
+          </a:p>
+        </p:txBody>
+      </p:sp>
+      <p:cxnSp>
+        <p:nvCxnSpPr>
+          <p:cNvPr id="8" name="Straight Connector 7">
+            <a:extLst>
+              <a:ext uri="{FF2B5EF4-FFF2-40B4-BE49-F238E27FC236}">
+                <a16:creationId xmlns:a16="http://schemas.microsoft.com/office/drawing/2014/main" id="{7041125F-A150-4071-870F-3BA7338D163C}"/>
+              </a:ext>
+            </a:extLst>
+          </p:cNvPr>
+          <p:cNvCxnSpPr>
+            <a:cxnSpLocks/>
+          </p:cNvCxnSpPr>
+          <p:nvPr/>
+        </p:nvCxnSpPr>
+        <p:spPr>
+          <a:xfrm flipV="1">
+            <a:off x="6096000" y="1963024"/>
+            <a:ext cx="0" cy="3491075"/>
+          </a:xfrm>
+          <a:prstGeom prst="line">
+            <a:avLst/>
+          </a:prstGeom>
+          <a:ln w="34925"/>
+        </p:spPr>
+        <p:style>
+          <a:lnRef idx="1">
+            <a:schemeClr val="accent2"/>
+          </a:lnRef>
+          <a:fillRef idx="0">
+            <a:schemeClr val="accent2"/>
+          </a:fillRef>
+          <a:effectRef idx="0">
+            <a:schemeClr val="accent2"/>
+          </a:effectRef>
+          <a:fontRef idx="minor">
+            <a:schemeClr val="tx1"/>
+          </a:fontRef>
+        </p:style>
+      </p:cxnSp>
+      <p:cxnSp>
+        <p:nvCxnSpPr>
+          <p:cNvPr id="10" name="Straight Connector 9">
+            <a:extLst>
+              <a:ext uri="{FF2B5EF4-FFF2-40B4-BE49-F238E27FC236}">
+                <a16:creationId xmlns:a16="http://schemas.microsoft.com/office/drawing/2014/main" id="{38043FDD-B333-48F5-B477-2A54BB9178BE}"/>
+              </a:ext>
+            </a:extLst>
+          </p:cNvPr>
+          <p:cNvCxnSpPr>
+            <a:cxnSpLocks/>
+          </p:cNvCxnSpPr>
+          <p:nvPr/>
+        </p:nvCxnSpPr>
+        <p:spPr>
+          <a:xfrm flipV="1">
+            <a:off x="7078910" y="1963023"/>
+            <a:ext cx="0" cy="3491075"/>
+          </a:xfrm>
+          <a:prstGeom prst="line">
+            <a:avLst/>
+          </a:prstGeom>
+          <a:ln w="34925"/>
+        </p:spPr>
+        <p:style>
+          <a:lnRef idx="1">
+            <a:schemeClr val="accent2"/>
+          </a:lnRef>
+          <a:fillRef idx="0">
+            <a:schemeClr val="accent2"/>
+          </a:fillRef>
+          <a:effectRef idx="0">
+            <a:schemeClr val="accent2"/>
+          </a:effectRef>
+          <a:fontRef idx="minor">
+            <a:schemeClr val="tx1"/>
+          </a:fontRef>
+        </p:style>
+      </p:cxnSp>
+      <p:sp>
+        <p:nvSpPr>
+          <p:cNvPr id="12" name="Freeform: Shape 11">
+            <a:extLst>
+              <a:ext uri="{FF2B5EF4-FFF2-40B4-BE49-F238E27FC236}">
+                <a16:creationId xmlns:a16="http://schemas.microsoft.com/office/drawing/2014/main" id="{8F3B8C38-D843-496F-9218-3052F5CADDD0}"/>
+              </a:ext>
+            </a:extLst>
+          </p:cNvPr>
+          <p:cNvSpPr/>
+          <p:nvPr/>
+        </p:nvSpPr>
+        <p:spPr>
+          <a:xfrm>
+            <a:off x="6129579" y="3229761"/>
+            <a:ext cx="850061" cy="2063692"/>
+          </a:xfrm>
+          <a:custGeom>
+            <a:avLst/>
+            <a:gdLst>
+              <a:gd name="connsiteX0" fmla="*/ 78274 w 850061"/>
+              <a:gd name="connsiteY0" fmla="*/ 0 h 2063692"/>
+              <a:gd name="connsiteX1" fmla="*/ 103441 w 850061"/>
+              <a:gd name="connsiteY1" fmla="*/ 100668 h 2063692"/>
+              <a:gd name="connsiteX2" fmla="*/ 53107 w 850061"/>
+              <a:gd name="connsiteY2" fmla="*/ 134224 h 2063692"/>
+              <a:gd name="connsiteX3" fmla="*/ 19551 w 850061"/>
+              <a:gd name="connsiteY3" fmla="*/ 159391 h 2063692"/>
+              <a:gd name="connsiteX4" fmla="*/ 2773 w 850061"/>
+              <a:gd name="connsiteY4" fmla="*/ 184558 h 2063692"/>
+              <a:gd name="connsiteX5" fmla="*/ 136997 w 850061"/>
+              <a:gd name="connsiteY5" fmla="*/ 176169 h 2063692"/>
+              <a:gd name="connsiteX6" fmla="*/ 254443 w 850061"/>
+              <a:gd name="connsiteY6" fmla="*/ 159391 h 2063692"/>
+              <a:gd name="connsiteX7" fmla="*/ 329944 w 850061"/>
+              <a:gd name="connsiteY7" fmla="*/ 167780 h 2063692"/>
+              <a:gd name="connsiteX8" fmla="*/ 321555 w 850061"/>
+              <a:gd name="connsiteY8" fmla="*/ 192947 h 2063692"/>
+              <a:gd name="connsiteX9" fmla="*/ 271221 w 850061"/>
+              <a:gd name="connsiteY9" fmla="*/ 234892 h 2063692"/>
+              <a:gd name="connsiteX10" fmla="*/ 246054 w 850061"/>
+              <a:gd name="connsiteY10" fmla="*/ 260059 h 2063692"/>
+              <a:gd name="connsiteX11" fmla="*/ 195720 w 850061"/>
+              <a:gd name="connsiteY11" fmla="*/ 293615 h 2063692"/>
+              <a:gd name="connsiteX12" fmla="*/ 136997 w 850061"/>
+              <a:gd name="connsiteY12" fmla="*/ 369116 h 2063692"/>
+              <a:gd name="connsiteX13" fmla="*/ 120219 w 850061"/>
+              <a:gd name="connsiteY13" fmla="*/ 394283 h 2063692"/>
+              <a:gd name="connsiteX14" fmla="*/ 95052 w 850061"/>
+              <a:gd name="connsiteY14" fmla="*/ 411061 h 2063692"/>
+              <a:gd name="connsiteX15" fmla="*/ 69885 w 850061"/>
+              <a:gd name="connsiteY15" fmla="*/ 436228 h 2063692"/>
+              <a:gd name="connsiteX16" fmla="*/ 128608 w 850061"/>
+              <a:gd name="connsiteY16" fmla="*/ 453006 h 2063692"/>
+              <a:gd name="connsiteX17" fmla="*/ 304777 w 850061"/>
+              <a:gd name="connsiteY17" fmla="*/ 436228 h 2063692"/>
+              <a:gd name="connsiteX18" fmla="*/ 371889 w 850061"/>
+              <a:gd name="connsiteY18" fmla="*/ 419450 h 2063692"/>
+              <a:gd name="connsiteX19" fmla="*/ 506113 w 850061"/>
+              <a:gd name="connsiteY19" fmla="*/ 427839 h 2063692"/>
+              <a:gd name="connsiteX20" fmla="*/ 447390 w 850061"/>
+              <a:gd name="connsiteY20" fmla="*/ 469784 h 2063692"/>
+              <a:gd name="connsiteX21" fmla="*/ 422223 w 850061"/>
+              <a:gd name="connsiteY21" fmla="*/ 478173 h 2063692"/>
+              <a:gd name="connsiteX22" fmla="*/ 397056 w 850061"/>
+              <a:gd name="connsiteY22" fmla="*/ 494951 h 2063692"/>
+              <a:gd name="connsiteX23" fmla="*/ 355111 w 850061"/>
+              <a:gd name="connsiteY23" fmla="*/ 511729 h 2063692"/>
+              <a:gd name="connsiteX24" fmla="*/ 304777 w 850061"/>
+              <a:gd name="connsiteY24" fmla="*/ 528507 h 2063692"/>
+              <a:gd name="connsiteX25" fmla="*/ 254443 w 850061"/>
+              <a:gd name="connsiteY25" fmla="*/ 562063 h 2063692"/>
+              <a:gd name="connsiteX26" fmla="*/ 220887 w 850061"/>
+              <a:gd name="connsiteY26" fmla="*/ 578841 h 2063692"/>
+              <a:gd name="connsiteX27" fmla="*/ 195720 w 850061"/>
+              <a:gd name="connsiteY27" fmla="*/ 604008 h 2063692"/>
+              <a:gd name="connsiteX28" fmla="*/ 162164 w 850061"/>
+              <a:gd name="connsiteY28" fmla="*/ 629175 h 2063692"/>
+              <a:gd name="connsiteX29" fmla="*/ 86663 w 850061"/>
+              <a:gd name="connsiteY29" fmla="*/ 687898 h 2063692"/>
+              <a:gd name="connsiteX30" fmla="*/ 153775 w 850061"/>
+              <a:gd name="connsiteY30" fmla="*/ 696287 h 2063692"/>
+              <a:gd name="connsiteX31" fmla="*/ 430612 w 850061"/>
+              <a:gd name="connsiteY31" fmla="*/ 671120 h 2063692"/>
+              <a:gd name="connsiteX32" fmla="*/ 724227 w 850061"/>
+              <a:gd name="connsiteY32" fmla="*/ 679509 h 2063692"/>
+              <a:gd name="connsiteX33" fmla="*/ 699060 w 850061"/>
+              <a:gd name="connsiteY33" fmla="*/ 687898 h 2063692"/>
+              <a:gd name="connsiteX34" fmla="*/ 665504 w 850061"/>
+              <a:gd name="connsiteY34" fmla="*/ 704676 h 2063692"/>
+              <a:gd name="connsiteX35" fmla="*/ 590003 w 850061"/>
+              <a:gd name="connsiteY35" fmla="*/ 721454 h 2063692"/>
+              <a:gd name="connsiteX36" fmla="*/ 531280 w 850061"/>
+              <a:gd name="connsiteY36" fmla="*/ 746621 h 2063692"/>
+              <a:gd name="connsiteX37" fmla="*/ 489335 w 850061"/>
+              <a:gd name="connsiteY37" fmla="*/ 755010 h 2063692"/>
+              <a:gd name="connsiteX38" fmla="*/ 430612 w 850061"/>
+              <a:gd name="connsiteY38" fmla="*/ 780177 h 2063692"/>
+              <a:gd name="connsiteX39" fmla="*/ 271221 w 850061"/>
+              <a:gd name="connsiteY39" fmla="*/ 830511 h 2063692"/>
+              <a:gd name="connsiteX40" fmla="*/ 237665 w 850061"/>
+              <a:gd name="connsiteY40" fmla="*/ 855678 h 2063692"/>
+              <a:gd name="connsiteX41" fmla="*/ 170553 w 850061"/>
+              <a:gd name="connsiteY41" fmla="*/ 889233 h 2063692"/>
+              <a:gd name="connsiteX42" fmla="*/ 145386 w 850061"/>
+              <a:gd name="connsiteY42" fmla="*/ 914400 h 2063692"/>
+              <a:gd name="connsiteX43" fmla="*/ 111830 w 850061"/>
+              <a:gd name="connsiteY43" fmla="*/ 964734 h 2063692"/>
+              <a:gd name="connsiteX44" fmla="*/ 363500 w 850061"/>
+              <a:gd name="connsiteY44" fmla="*/ 973123 h 2063692"/>
+              <a:gd name="connsiteX45" fmla="*/ 489335 w 850061"/>
+              <a:gd name="connsiteY45" fmla="*/ 956345 h 2063692"/>
+              <a:gd name="connsiteX46" fmla="*/ 564836 w 850061"/>
+              <a:gd name="connsiteY46" fmla="*/ 939567 h 2063692"/>
+              <a:gd name="connsiteX47" fmla="*/ 648726 w 850061"/>
+              <a:gd name="connsiteY47" fmla="*/ 931178 h 2063692"/>
+              <a:gd name="connsiteX48" fmla="*/ 682282 w 850061"/>
+              <a:gd name="connsiteY48" fmla="*/ 939567 h 2063692"/>
+              <a:gd name="connsiteX49" fmla="*/ 631948 w 850061"/>
+              <a:gd name="connsiteY49" fmla="*/ 956345 h 2063692"/>
+              <a:gd name="connsiteX50" fmla="*/ 581614 w 850061"/>
+              <a:gd name="connsiteY50" fmla="*/ 989901 h 2063692"/>
+              <a:gd name="connsiteX51" fmla="*/ 539669 w 850061"/>
+              <a:gd name="connsiteY51" fmla="*/ 1015068 h 2063692"/>
+              <a:gd name="connsiteX52" fmla="*/ 447390 w 850061"/>
+              <a:gd name="connsiteY52" fmla="*/ 1090569 h 2063692"/>
+              <a:gd name="connsiteX53" fmla="*/ 388667 w 850061"/>
+              <a:gd name="connsiteY53" fmla="*/ 1132514 h 2063692"/>
+              <a:gd name="connsiteX54" fmla="*/ 338333 w 850061"/>
+              <a:gd name="connsiteY54" fmla="*/ 1166070 h 2063692"/>
+              <a:gd name="connsiteX55" fmla="*/ 304777 w 850061"/>
+              <a:gd name="connsiteY55" fmla="*/ 1182848 h 2063692"/>
+              <a:gd name="connsiteX56" fmla="*/ 279610 w 850061"/>
+              <a:gd name="connsiteY56" fmla="*/ 1208015 h 2063692"/>
+              <a:gd name="connsiteX57" fmla="*/ 220887 w 850061"/>
+              <a:gd name="connsiteY57" fmla="*/ 1241571 h 2063692"/>
+              <a:gd name="connsiteX58" fmla="*/ 170553 w 850061"/>
+              <a:gd name="connsiteY58" fmla="*/ 1275127 h 2063692"/>
+              <a:gd name="connsiteX59" fmla="*/ 145386 w 850061"/>
+              <a:gd name="connsiteY59" fmla="*/ 1291905 h 2063692"/>
+              <a:gd name="connsiteX60" fmla="*/ 187331 w 850061"/>
+              <a:gd name="connsiteY60" fmla="*/ 1300294 h 2063692"/>
+              <a:gd name="connsiteX61" fmla="*/ 212498 w 850061"/>
+              <a:gd name="connsiteY61" fmla="*/ 1291905 h 2063692"/>
+              <a:gd name="connsiteX62" fmla="*/ 321555 w 850061"/>
+              <a:gd name="connsiteY62" fmla="*/ 1266738 h 2063692"/>
+              <a:gd name="connsiteX63" fmla="*/ 422223 w 850061"/>
+              <a:gd name="connsiteY63" fmla="*/ 1258349 h 2063692"/>
+              <a:gd name="connsiteX64" fmla="*/ 472557 w 850061"/>
+              <a:gd name="connsiteY64" fmla="*/ 1249960 h 2063692"/>
+              <a:gd name="connsiteX65" fmla="*/ 531280 w 850061"/>
+              <a:gd name="connsiteY65" fmla="*/ 1241571 h 2063692"/>
+              <a:gd name="connsiteX66" fmla="*/ 598392 w 850061"/>
+              <a:gd name="connsiteY66" fmla="*/ 1233182 h 2063692"/>
+              <a:gd name="connsiteX67" fmla="*/ 673893 w 850061"/>
+              <a:gd name="connsiteY67" fmla="*/ 1216404 h 2063692"/>
+              <a:gd name="connsiteX68" fmla="*/ 757782 w 850061"/>
+              <a:gd name="connsiteY68" fmla="*/ 1224793 h 2063692"/>
+              <a:gd name="connsiteX69" fmla="*/ 715838 w 850061"/>
+              <a:gd name="connsiteY69" fmla="*/ 1275127 h 2063692"/>
+              <a:gd name="connsiteX70" fmla="*/ 682282 w 850061"/>
+              <a:gd name="connsiteY70" fmla="*/ 1291905 h 2063692"/>
+              <a:gd name="connsiteX71" fmla="*/ 657115 w 850061"/>
+              <a:gd name="connsiteY71" fmla="*/ 1308683 h 2063692"/>
+              <a:gd name="connsiteX72" fmla="*/ 631948 w 850061"/>
+              <a:gd name="connsiteY72" fmla="*/ 1317072 h 2063692"/>
+              <a:gd name="connsiteX73" fmla="*/ 606781 w 850061"/>
+              <a:gd name="connsiteY73" fmla="*/ 1333850 h 2063692"/>
+              <a:gd name="connsiteX74" fmla="*/ 506113 w 850061"/>
+              <a:gd name="connsiteY74" fmla="*/ 1384184 h 2063692"/>
+              <a:gd name="connsiteX75" fmla="*/ 464168 w 850061"/>
+              <a:gd name="connsiteY75" fmla="*/ 1426129 h 2063692"/>
+              <a:gd name="connsiteX76" fmla="*/ 439001 w 850061"/>
+              <a:gd name="connsiteY76" fmla="*/ 1451296 h 2063692"/>
+              <a:gd name="connsiteX77" fmla="*/ 388667 w 850061"/>
+              <a:gd name="connsiteY77" fmla="*/ 1476463 h 2063692"/>
+              <a:gd name="connsiteX78" fmla="*/ 329944 w 850061"/>
+              <a:gd name="connsiteY78" fmla="*/ 1501630 h 2063692"/>
+              <a:gd name="connsiteX79" fmla="*/ 254443 w 850061"/>
+              <a:gd name="connsiteY79" fmla="*/ 1543575 h 2063692"/>
+              <a:gd name="connsiteX80" fmla="*/ 212498 w 850061"/>
+              <a:gd name="connsiteY80" fmla="*/ 1551964 h 2063692"/>
+              <a:gd name="connsiteX81" fmla="*/ 162164 w 850061"/>
+              <a:gd name="connsiteY81" fmla="*/ 1577131 h 2063692"/>
+              <a:gd name="connsiteX82" fmla="*/ 136997 w 850061"/>
+              <a:gd name="connsiteY82" fmla="*/ 1593909 h 2063692"/>
+              <a:gd name="connsiteX83" fmla="*/ 204109 w 850061"/>
+              <a:gd name="connsiteY83" fmla="*/ 1585520 h 2063692"/>
+              <a:gd name="connsiteX84" fmla="*/ 296388 w 850061"/>
+              <a:gd name="connsiteY84" fmla="*/ 1568742 h 2063692"/>
+              <a:gd name="connsiteX85" fmla="*/ 321555 w 850061"/>
+              <a:gd name="connsiteY85" fmla="*/ 1560353 h 2063692"/>
+              <a:gd name="connsiteX86" fmla="*/ 413834 w 850061"/>
+              <a:gd name="connsiteY86" fmla="*/ 1551964 h 2063692"/>
+              <a:gd name="connsiteX87" fmla="*/ 506113 w 850061"/>
+              <a:gd name="connsiteY87" fmla="*/ 1535186 h 2063692"/>
+              <a:gd name="connsiteX88" fmla="*/ 573225 w 850061"/>
+              <a:gd name="connsiteY88" fmla="*/ 1526797 h 2063692"/>
+              <a:gd name="connsiteX89" fmla="*/ 623559 w 850061"/>
+              <a:gd name="connsiteY89" fmla="*/ 1518408 h 2063692"/>
+              <a:gd name="connsiteX90" fmla="*/ 640337 w 850061"/>
+              <a:gd name="connsiteY90" fmla="*/ 1543575 h 2063692"/>
+              <a:gd name="connsiteX91" fmla="*/ 598392 w 850061"/>
+              <a:gd name="connsiteY91" fmla="*/ 1568742 h 2063692"/>
+              <a:gd name="connsiteX92" fmla="*/ 573225 w 850061"/>
+              <a:gd name="connsiteY92" fmla="*/ 1593909 h 2063692"/>
+              <a:gd name="connsiteX93" fmla="*/ 548058 w 850061"/>
+              <a:gd name="connsiteY93" fmla="*/ 1610687 h 2063692"/>
+              <a:gd name="connsiteX94" fmla="*/ 514502 w 850061"/>
+              <a:gd name="connsiteY94" fmla="*/ 1635854 h 2063692"/>
+              <a:gd name="connsiteX95" fmla="*/ 480946 w 850061"/>
+              <a:gd name="connsiteY95" fmla="*/ 1644243 h 2063692"/>
+              <a:gd name="connsiteX96" fmla="*/ 455779 w 850061"/>
+              <a:gd name="connsiteY96" fmla="*/ 1652632 h 2063692"/>
+              <a:gd name="connsiteX97" fmla="*/ 413834 w 850061"/>
+              <a:gd name="connsiteY97" fmla="*/ 1677799 h 2063692"/>
+              <a:gd name="connsiteX98" fmla="*/ 329944 w 850061"/>
+              <a:gd name="connsiteY98" fmla="*/ 1736522 h 2063692"/>
+              <a:gd name="connsiteX99" fmla="*/ 254443 w 850061"/>
+              <a:gd name="connsiteY99" fmla="*/ 1761689 h 2063692"/>
+              <a:gd name="connsiteX100" fmla="*/ 229276 w 850061"/>
+              <a:gd name="connsiteY100" fmla="*/ 1778467 h 2063692"/>
+              <a:gd name="connsiteX101" fmla="*/ 204109 w 850061"/>
+              <a:gd name="connsiteY101" fmla="*/ 1803633 h 2063692"/>
+              <a:gd name="connsiteX102" fmla="*/ 178942 w 850061"/>
+              <a:gd name="connsiteY102" fmla="*/ 1812022 h 2063692"/>
+              <a:gd name="connsiteX103" fmla="*/ 162164 w 850061"/>
+              <a:gd name="connsiteY103" fmla="*/ 1837189 h 2063692"/>
+              <a:gd name="connsiteX104" fmla="*/ 136997 w 850061"/>
+              <a:gd name="connsiteY104" fmla="*/ 1853967 h 2063692"/>
+              <a:gd name="connsiteX105" fmla="*/ 145386 w 850061"/>
+              <a:gd name="connsiteY105" fmla="*/ 1879134 h 2063692"/>
+              <a:gd name="connsiteX106" fmla="*/ 204109 w 850061"/>
+              <a:gd name="connsiteY106" fmla="*/ 1870745 h 2063692"/>
+              <a:gd name="connsiteX107" fmla="*/ 229276 w 850061"/>
+              <a:gd name="connsiteY107" fmla="*/ 1862356 h 2063692"/>
+              <a:gd name="connsiteX108" fmla="*/ 296388 w 850061"/>
+              <a:gd name="connsiteY108" fmla="*/ 1853967 h 2063692"/>
+              <a:gd name="connsiteX109" fmla="*/ 380278 w 850061"/>
+              <a:gd name="connsiteY109" fmla="*/ 1837189 h 2063692"/>
+              <a:gd name="connsiteX110" fmla="*/ 573225 w 850061"/>
+              <a:gd name="connsiteY110" fmla="*/ 1828800 h 2063692"/>
+              <a:gd name="connsiteX111" fmla="*/ 673893 w 850061"/>
+              <a:gd name="connsiteY111" fmla="*/ 1828800 h 2063692"/>
+              <a:gd name="connsiteX112" fmla="*/ 573225 w 850061"/>
+              <a:gd name="connsiteY112" fmla="*/ 1887523 h 2063692"/>
+              <a:gd name="connsiteX113" fmla="*/ 413834 w 850061"/>
+              <a:gd name="connsiteY113" fmla="*/ 1937857 h 2063692"/>
+              <a:gd name="connsiteX114" fmla="*/ 313166 w 850061"/>
+              <a:gd name="connsiteY114" fmla="*/ 1963024 h 2063692"/>
+              <a:gd name="connsiteX115" fmla="*/ 262832 w 850061"/>
+              <a:gd name="connsiteY115" fmla="*/ 1979802 h 2063692"/>
+              <a:gd name="connsiteX116" fmla="*/ 187331 w 850061"/>
+              <a:gd name="connsiteY116" fmla="*/ 2021747 h 2063692"/>
+              <a:gd name="connsiteX117" fmla="*/ 791338 w 850061"/>
+              <a:gd name="connsiteY117" fmla="*/ 2046914 h 2063692"/>
+              <a:gd name="connsiteX118" fmla="*/ 841672 w 850061"/>
+              <a:gd name="connsiteY118" fmla="*/ 2063692 h 2063692"/>
+              <a:gd name="connsiteX119" fmla="*/ 850061 w 850061"/>
+              <a:gd name="connsiteY119" fmla="*/ 2063692 h 2063692"/>
+            </a:gdLst>
+            <a:ahLst/>
+            <a:cxnLst>
+              <a:cxn ang="0">
+                <a:pos x="connsiteX0" y="connsiteY0"/>
+              </a:cxn>
+              <a:cxn ang="0">
+                <a:pos x="connsiteX1" y="connsiteY1"/>
+              </a:cxn>
+              <a:cxn ang="0">
+                <a:pos x="connsiteX2" y="connsiteY2"/>
+              </a:cxn>
+              <a:cxn ang="0">
+                <a:pos x="connsiteX3" y="connsiteY3"/>
+              </a:cxn>
+              <a:cxn ang="0">
+                <a:pos x="connsiteX4" y="connsiteY4"/>
+              </a:cxn>
+              <a:cxn ang="0">
+                <a:pos x="connsiteX5" y="connsiteY5"/>
+              </a:cxn>
+              <a:cxn ang="0">
+                <a:pos x="connsiteX6" y="connsiteY6"/>
+              </a:cxn>
+              <a:cxn ang="0">
+                <a:pos x="connsiteX7" y="connsiteY7"/>
+              </a:cxn>
+              <a:cxn ang="0">
+                <a:pos x="connsiteX8" y="connsiteY8"/>
+              </a:cxn>
+              <a:cxn ang="0">
+                <a:pos x="connsiteX9" y="connsiteY9"/>
+              </a:cxn>
+              <a:cxn ang="0">
+                <a:pos x="connsiteX10" y="connsiteY10"/>
+              </a:cxn>
+              <a:cxn ang="0">
+                <a:pos x="connsiteX11" y="connsiteY11"/>
+              </a:cxn>
+              <a:cxn ang="0">
+                <a:pos x="connsiteX12" y="connsiteY12"/>
+              </a:cxn>
+              <a:cxn ang="0">
+                <a:pos x="connsiteX13" y="connsiteY13"/>
+              </a:cxn>
+              <a:cxn ang="0">
+                <a:pos x="connsiteX14" y="connsiteY14"/>
+              </a:cxn>
+              <a:cxn ang="0">
+                <a:pos x="connsiteX15" y="connsiteY15"/>
+              </a:cxn>
+              <a:cxn ang="0">
+                <a:pos x="connsiteX16" y="connsiteY16"/>
+              </a:cxn>
+              <a:cxn ang="0">
+                <a:pos x="connsiteX17" y="connsiteY17"/>
+              </a:cxn>
+              <a:cxn ang="0">
+                <a:pos x="connsiteX18" y="connsiteY18"/>
+              </a:cxn>
+              <a:cxn ang="0">
+                <a:pos x="connsiteX19" y="connsiteY19"/>
+              </a:cxn>
+              <a:cxn ang="0">
+                <a:pos x="connsiteX20" y="connsiteY20"/>
+              </a:cxn>
+              <a:cxn ang="0">
+                <a:pos x="connsiteX21" y="connsiteY21"/>
+              </a:cxn>
+              <a:cxn ang="0">
+                <a:pos x="connsiteX22" y="connsiteY22"/>
+              </a:cxn>
+              <a:cxn ang="0">
+                <a:pos x="connsiteX23" y="connsiteY23"/>
+              </a:cxn>
+              <a:cxn ang="0">
+                <a:pos x="connsiteX24" y="connsiteY24"/>
+              </a:cxn>
+              <a:cxn ang="0">
+                <a:pos x="connsiteX25" y="connsiteY25"/>
+              </a:cxn>
+              <a:cxn ang="0">
+                <a:pos x="connsiteX26" y="connsiteY26"/>
+              </a:cxn>
+              <a:cxn ang="0">
+                <a:pos x="connsiteX27" y="connsiteY27"/>
+              </a:cxn>
+              <a:cxn ang="0">
+                <a:pos x="connsiteX28" y="connsiteY28"/>
+              </a:cxn>
+              <a:cxn ang="0">
+                <a:pos x="connsiteX29" y="connsiteY29"/>
+              </a:cxn>
+              <a:cxn ang="0">
+                <a:pos x="connsiteX30" y="connsiteY30"/>
+              </a:cxn>
+              <a:cxn ang="0">
+                <a:pos x="connsiteX31" y="connsiteY31"/>
+              </a:cxn>
+              <a:cxn ang="0">
+                <a:pos x="connsiteX32" y="connsiteY32"/>
+              </a:cxn>
+              <a:cxn ang="0">
+                <a:pos x="connsiteX33" y="connsiteY33"/>
+              </a:cxn>
+              <a:cxn ang="0">
+                <a:pos x="connsiteX34" y="connsiteY34"/>
+              </a:cxn>
+              <a:cxn ang="0">
+                <a:pos x="connsiteX35" y="connsiteY35"/>
+              </a:cxn>
+              <a:cxn ang="0">
+                <a:pos x="connsiteX36" y="connsiteY36"/>
+              </a:cxn>
+              <a:cxn ang="0">
+                <a:pos x="connsiteX37" y="connsiteY37"/>
+              </a:cxn>
+              <a:cxn ang="0">
+                <a:pos x="connsiteX38" y="connsiteY38"/>
+              </a:cxn>
+              <a:cxn ang="0">
+                <a:pos x="connsiteX39" y="connsiteY39"/>
+              </a:cxn>
+              <a:cxn ang="0">
+                <a:pos x="connsiteX40" y="connsiteY40"/>
+              </a:cxn>
+              <a:cxn ang="0">
+                <a:pos x="connsiteX41" y="connsiteY41"/>
+              </a:cxn>
+              <a:cxn ang="0">
+                <a:pos x="connsiteX42" y="connsiteY42"/>
+              </a:cxn>
+              <a:cxn ang="0">
+                <a:pos x="connsiteX43" y="connsiteY43"/>
+              </a:cxn>
+              <a:cxn ang="0">
+                <a:pos x="connsiteX44" y="connsiteY44"/>
+              </a:cxn>
+              <a:cxn ang="0">
+                <a:pos x="connsiteX45" y="connsiteY45"/>
+              </a:cxn>
+              <a:cxn ang="0">
+                <a:pos x="connsiteX46" y="connsiteY46"/>
+              </a:cxn>
+              <a:cxn ang="0">
+                <a:pos x="connsiteX47" y="connsiteY47"/>
+              </a:cxn>
+              <a:cxn ang="0">
+                <a:pos x="connsiteX48" y="connsiteY48"/>
+              </a:cxn>
+              <a:cxn ang="0">
+                <a:pos x="connsiteX49" y="connsiteY49"/>
+              </a:cxn>
+              <a:cxn ang="0">
+                <a:pos x="connsiteX50" y="connsiteY50"/>
+              </a:cxn>
+              <a:cxn ang="0">
+                <a:pos x="connsiteX51" y="connsiteY51"/>
+              </a:cxn>
+              <a:cxn ang="0">
+                <a:pos x="connsiteX52" y="connsiteY52"/>
+              </a:cxn>
+              <a:cxn ang="0">
+                <a:pos x="connsiteX53" y="connsiteY53"/>
+              </a:cxn>
+              <a:cxn ang="0">
+                <a:pos x="connsiteX54" y="connsiteY54"/>
+              </a:cxn>
+              <a:cxn ang="0">
+                <a:pos x="connsiteX55" y="connsiteY55"/>
+              </a:cxn>
+              <a:cxn ang="0">
+                <a:pos x="connsiteX56" y="connsiteY56"/>
+              </a:cxn>
+              <a:cxn ang="0">
+                <a:pos x="connsiteX57" y="connsiteY57"/>
+              </a:cxn>
+              <a:cxn ang="0">
+                <a:pos x="connsiteX58" y="connsiteY58"/>
+              </a:cxn>
+              <a:cxn ang="0">
+                <a:pos x="connsiteX59" y="connsiteY59"/>
+              </a:cxn>
+              <a:cxn ang="0">
+                <a:pos x="connsiteX60" y="connsiteY60"/>
+              </a:cxn>
+              <a:cxn ang="0">
+                <a:pos x="connsiteX61" y="connsiteY61"/>
+              </a:cxn>
+              <a:cxn ang="0">
+                <a:pos x="connsiteX62" y="connsiteY62"/>
+              </a:cxn>
+              <a:cxn ang="0">
+                <a:pos x="connsiteX63" y="connsiteY63"/>
+              </a:cxn>
+              <a:cxn ang="0">
+                <a:pos x="connsiteX64" y="connsiteY64"/>
+              </a:cxn>
+              <a:cxn ang="0">
+                <a:pos x="connsiteX65" y="connsiteY65"/>
+              </a:cxn>
+              <a:cxn ang="0">
+                <a:pos x="connsiteX66" y="connsiteY66"/>
+              </a:cxn>
+              <a:cxn ang="0">
+                <a:pos x="connsiteX67" y="connsiteY67"/>
+              </a:cxn>
+              <a:cxn ang="0">
+                <a:pos x="connsiteX68" y="connsiteY68"/>
+              </a:cxn>
+              <a:cxn ang="0">
+                <a:pos x="connsiteX69" y="connsiteY69"/>
+              </a:cxn>
+              <a:cxn ang="0">
+                <a:pos x="connsiteX70" y="connsiteY70"/>
+              </a:cxn>
+              <a:cxn ang="0">
+                <a:pos x="connsiteX71" y="connsiteY71"/>
+              </a:cxn>
+              <a:cxn ang="0">
+                <a:pos x="connsiteX72" y="connsiteY72"/>
+              </a:cxn>
+              <a:cxn ang="0">
+                <a:pos x="connsiteX73" y="connsiteY73"/>
+              </a:cxn>
+              <a:cxn ang="0">
+                <a:pos x="connsiteX74" y="connsiteY74"/>
+              </a:cxn>
+              <a:cxn ang="0">
+                <a:pos x="connsiteX75" y="connsiteY75"/>
+              </a:cxn>
+              <a:cxn ang="0">
+                <a:pos x="connsiteX76" y="connsiteY76"/>
+              </a:cxn>
+              <a:cxn ang="0">
+                <a:pos x="connsiteX77" y="connsiteY77"/>
+              </a:cxn>
+              <a:cxn ang="0">
+                <a:pos x="connsiteX78" y="connsiteY78"/>
+              </a:cxn>
+              <a:cxn ang="0">
+                <a:pos x="connsiteX79" y="connsiteY79"/>
+              </a:cxn>
+              <a:cxn ang="0">
+                <a:pos x="connsiteX80" y="connsiteY80"/>
+              </a:cxn>
+              <a:cxn ang="0">
+                <a:pos x="connsiteX81" y="connsiteY81"/>
+              </a:cxn>
+              <a:cxn ang="0">
+                <a:pos x="connsiteX82" y="connsiteY82"/>
+              </a:cxn>
+              <a:cxn ang="0">
+                <a:pos x="connsiteX83" y="connsiteY83"/>
+              </a:cxn>
+              <a:cxn ang="0">
+                <a:pos x="connsiteX84" y="connsiteY84"/>
+              </a:cxn>
+              <a:cxn ang="0">
+                <a:pos x="connsiteX85" y="connsiteY85"/>
+              </a:cxn>
+              <a:cxn ang="0">
+                <a:pos x="connsiteX86" y="connsiteY86"/>
+              </a:cxn>
+              <a:cxn ang="0">
+                <a:pos x="connsiteX87" y="connsiteY87"/>
+              </a:cxn>
+              <a:cxn ang="0">
+                <a:pos x="connsiteX88" y="connsiteY88"/>
+              </a:cxn>
+              <a:cxn ang="0">
+                <a:pos x="connsiteX89" y="connsiteY89"/>
+              </a:cxn>
+              <a:cxn ang="0">
+                <a:pos x="connsiteX90" y="connsiteY90"/>
+              </a:cxn>
+              <a:cxn ang="0">
+                <a:pos x="connsiteX91" y="connsiteY91"/>
+              </a:cxn>
+              <a:cxn ang="0">
+                <a:pos x="connsiteX92" y="connsiteY92"/>
+              </a:cxn>
+              <a:cxn ang="0">
+                <a:pos x="connsiteX93" y="connsiteY93"/>
+              </a:cxn>
+              <a:cxn ang="0">
+                <a:pos x="connsiteX94" y="connsiteY94"/>
+              </a:cxn>
+              <a:cxn ang="0">
+                <a:pos x="connsiteX95" y="connsiteY95"/>
+              </a:cxn>
+              <a:cxn ang="0">
+                <a:pos x="connsiteX96" y="connsiteY96"/>
+              </a:cxn>
+              <a:cxn ang="0">
+                <a:pos x="connsiteX97" y="connsiteY97"/>
+              </a:cxn>
+              <a:cxn ang="0">
+                <a:pos x="connsiteX98" y="connsiteY98"/>
+              </a:cxn>
+              <a:cxn ang="0">
+                <a:pos x="connsiteX99" y="connsiteY99"/>
+              </a:cxn>
+              <a:cxn ang="0">
+                <a:pos x="connsiteX100" y="connsiteY100"/>
+              </a:cxn>
+              <a:cxn ang="0">
+                <a:pos x="connsiteX101" y="connsiteY101"/>
+              </a:cxn>
+              <a:cxn ang="0">
+                <a:pos x="connsiteX102" y="connsiteY102"/>
+              </a:cxn>
+              <a:cxn ang="0">
+                <a:pos x="connsiteX103" y="connsiteY103"/>
+              </a:cxn>
+              <a:cxn ang="0">
+                <a:pos x="connsiteX104" y="connsiteY104"/>
+              </a:cxn>
+              <a:cxn ang="0">
+                <a:pos x="connsiteX105" y="connsiteY105"/>
+              </a:cxn>
+              <a:cxn ang="0">
+                <a:pos x="connsiteX106" y="connsiteY106"/>
+              </a:cxn>
+              <a:cxn ang="0">
+                <a:pos x="connsiteX107" y="connsiteY107"/>
+              </a:cxn>
+              <a:cxn ang="0">
+                <a:pos x="connsiteX108" y="connsiteY108"/>
+              </a:cxn>
+              <a:cxn ang="0">
+                <a:pos x="connsiteX109" y="connsiteY109"/>
+              </a:cxn>
+              <a:cxn ang="0">
+                <a:pos x="connsiteX110" y="connsiteY110"/>
+              </a:cxn>
+              <a:cxn ang="0">
+                <a:pos x="connsiteX111" y="connsiteY111"/>
+              </a:cxn>
+              <a:cxn ang="0">
+                <a:pos x="connsiteX112" y="connsiteY112"/>
+              </a:cxn>
+              <a:cxn ang="0">
+                <a:pos x="connsiteX113" y="connsiteY113"/>
+              </a:cxn>
+              <a:cxn ang="0">
+                <a:pos x="connsiteX114" y="connsiteY114"/>
+              </a:cxn>
+              <a:cxn ang="0">
+                <a:pos x="connsiteX115" y="connsiteY115"/>
+              </a:cxn>
+              <a:cxn ang="0">
+                <a:pos x="connsiteX116" y="connsiteY116"/>
+              </a:cxn>
+              <a:cxn ang="0">
+                <a:pos x="connsiteX117" y="connsiteY117"/>
+              </a:cxn>
+              <a:cxn ang="0">
+                <a:pos x="connsiteX118" y="connsiteY118"/>
+              </a:cxn>
+              <a:cxn ang="0">
+                <a:pos x="connsiteX119" y="connsiteY119"/>
+              </a:cxn>
+            </a:cxnLst>
+            <a:rect l="l" t="t" r="r" b="b"/>
+            <a:pathLst>
+              <a:path w="850061" h="2063692">
+                <a:moveTo>
+                  <a:pt x="78274" y="0"/>
+                </a:moveTo>
+                <a:cubicBezTo>
+                  <a:pt x="125724" y="28470"/>
+                  <a:pt x="150006" y="25000"/>
+                  <a:pt x="103441" y="100668"/>
+                </a:cubicBezTo>
+                <a:cubicBezTo>
+                  <a:pt x="92873" y="117841"/>
+                  <a:pt x="69239" y="122125"/>
+                  <a:pt x="53107" y="134224"/>
+                </a:cubicBezTo>
+                <a:cubicBezTo>
+                  <a:pt x="41922" y="142613"/>
+                  <a:pt x="29438" y="149504"/>
+                  <a:pt x="19551" y="159391"/>
+                </a:cubicBezTo>
+                <a:cubicBezTo>
+                  <a:pt x="12422" y="166520"/>
+                  <a:pt x="-7208" y="183132"/>
+                  <a:pt x="2773" y="184558"/>
+                </a:cubicBezTo>
+                <a:cubicBezTo>
+                  <a:pt x="47151" y="190898"/>
+                  <a:pt x="92256" y="178965"/>
+                  <a:pt x="136997" y="176169"/>
+                </a:cubicBezTo>
+                <a:cubicBezTo>
+                  <a:pt x="175720" y="168424"/>
+                  <a:pt x="214589" y="159391"/>
+                  <a:pt x="254443" y="159391"/>
+                </a:cubicBezTo>
+                <a:cubicBezTo>
+                  <a:pt x="279765" y="159391"/>
+                  <a:pt x="304777" y="164984"/>
+                  <a:pt x="329944" y="167780"/>
+                </a:cubicBezTo>
+                <a:cubicBezTo>
+                  <a:pt x="327148" y="176169"/>
+                  <a:pt x="326460" y="185589"/>
+                  <a:pt x="321555" y="192947"/>
+                </a:cubicBezTo>
+                <a:cubicBezTo>
+                  <a:pt x="303174" y="220519"/>
+                  <a:pt x="294434" y="215548"/>
+                  <a:pt x="271221" y="234892"/>
+                </a:cubicBezTo>
+                <a:cubicBezTo>
+                  <a:pt x="262107" y="242487"/>
+                  <a:pt x="255419" y="252775"/>
+                  <a:pt x="246054" y="260059"/>
+                </a:cubicBezTo>
+                <a:cubicBezTo>
+                  <a:pt x="230137" y="272439"/>
+                  <a:pt x="195720" y="293615"/>
+                  <a:pt x="195720" y="293615"/>
+                </a:cubicBezTo>
+                <a:cubicBezTo>
+                  <a:pt x="110909" y="420831"/>
+                  <a:pt x="202706" y="290265"/>
+                  <a:pt x="136997" y="369116"/>
+                </a:cubicBezTo>
+                <a:cubicBezTo>
+                  <a:pt x="130542" y="376861"/>
+                  <a:pt x="127348" y="387154"/>
+                  <a:pt x="120219" y="394283"/>
+                </a:cubicBezTo>
+                <a:cubicBezTo>
+                  <a:pt x="113090" y="401412"/>
+                  <a:pt x="102797" y="404606"/>
+                  <a:pt x="95052" y="411061"/>
+                </a:cubicBezTo>
+                <a:cubicBezTo>
+                  <a:pt x="85938" y="418656"/>
+                  <a:pt x="78274" y="427839"/>
+                  <a:pt x="69885" y="436228"/>
+                </a:cubicBezTo>
+                <a:cubicBezTo>
+                  <a:pt x="89459" y="441821"/>
+                  <a:pt x="108250" y="453006"/>
+                  <a:pt x="128608" y="453006"/>
+                </a:cubicBezTo>
+                <a:cubicBezTo>
+                  <a:pt x="187597" y="453006"/>
+                  <a:pt x="304777" y="436228"/>
+                  <a:pt x="304777" y="436228"/>
+                </a:cubicBezTo>
+                <a:cubicBezTo>
+                  <a:pt x="324636" y="429608"/>
+                  <a:pt x="351643" y="419450"/>
+                  <a:pt x="371889" y="419450"/>
+                </a:cubicBezTo>
+                <a:cubicBezTo>
+                  <a:pt x="416718" y="419450"/>
+                  <a:pt x="461372" y="425043"/>
+                  <a:pt x="506113" y="427839"/>
+                </a:cubicBezTo>
+                <a:cubicBezTo>
+                  <a:pt x="498513" y="433539"/>
+                  <a:pt x="459657" y="463651"/>
+                  <a:pt x="447390" y="469784"/>
+                </a:cubicBezTo>
+                <a:cubicBezTo>
+                  <a:pt x="439481" y="473739"/>
+                  <a:pt x="430132" y="474218"/>
+                  <a:pt x="422223" y="478173"/>
+                </a:cubicBezTo>
+                <a:cubicBezTo>
+                  <a:pt x="413205" y="482682"/>
+                  <a:pt x="406074" y="490442"/>
+                  <a:pt x="397056" y="494951"/>
+                </a:cubicBezTo>
+                <a:cubicBezTo>
+                  <a:pt x="383587" y="501685"/>
+                  <a:pt x="369263" y="506583"/>
+                  <a:pt x="355111" y="511729"/>
+                </a:cubicBezTo>
+                <a:cubicBezTo>
+                  <a:pt x="338490" y="517773"/>
+                  <a:pt x="319492" y="518697"/>
+                  <a:pt x="304777" y="528507"/>
+                </a:cubicBezTo>
+                <a:cubicBezTo>
+                  <a:pt x="287999" y="539692"/>
+                  <a:pt x="272479" y="553045"/>
+                  <a:pt x="254443" y="562063"/>
+                </a:cubicBezTo>
+                <a:cubicBezTo>
+                  <a:pt x="243258" y="567656"/>
+                  <a:pt x="231063" y="571572"/>
+                  <a:pt x="220887" y="578841"/>
+                </a:cubicBezTo>
+                <a:cubicBezTo>
+                  <a:pt x="211233" y="585737"/>
+                  <a:pt x="204728" y="596287"/>
+                  <a:pt x="195720" y="604008"/>
+                </a:cubicBezTo>
+                <a:cubicBezTo>
+                  <a:pt x="185104" y="613107"/>
+                  <a:pt x="173618" y="621157"/>
+                  <a:pt x="162164" y="629175"/>
+                </a:cubicBezTo>
+                <a:cubicBezTo>
+                  <a:pt x="95269" y="676001"/>
+                  <a:pt x="130024" y="644537"/>
+                  <a:pt x="86663" y="687898"/>
+                </a:cubicBezTo>
+                <a:cubicBezTo>
+                  <a:pt x="142920" y="716027"/>
+                  <a:pt x="96665" y="701998"/>
+                  <a:pt x="153775" y="696287"/>
+                </a:cubicBezTo>
+                <a:cubicBezTo>
+                  <a:pt x="519665" y="659698"/>
+                  <a:pt x="264977" y="694782"/>
+                  <a:pt x="430612" y="671120"/>
+                </a:cubicBezTo>
+                <a:cubicBezTo>
+                  <a:pt x="528484" y="673916"/>
+                  <a:pt x="626506" y="673401"/>
+                  <a:pt x="724227" y="679509"/>
+                </a:cubicBezTo>
+                <a:cubicBezTo>
+                  <a:pt x="733053" y="680061"/>
+                  <a:pt x="707188" y="684415"/>
+                  <a:pt x="699060" y="687898"/>
+                </a:cubicBezTo>
+                <a:cubicBezTo>
+                  <a:pt x="687566" y="692824"/>
+                  <a:pt x="677213" y="700285"/>
+                  <a:pt x="665504" y="704676"/>
+                </a:cubicBezTo>
+                <a:cubicBezTo>
+                  <a:pt x="651964" y="709753"/>
+                  <a:pt x="601393" y="719176"/>
+                  <a:pt x="590003" y="721454"/>
+                </a:cubicBezTo>
+                <a:cubicBezTo>
+                  <a:pt x="570429" y="729843"/>
+                  <a:pt x="551483" y="739887"/>
+                  <a:pt x="531280" y="746621"/>
+                </a:cubicBezTo>
+                <a:cubicBezTo>
+                  <a:pt x="517753" y="751130"/>
+                  <a:pt x="502862" y="750501"/>
+                  <a:pt x="489335" y="755010"/>
+                </a:cubicBezTo>
+                <a:cubicBezTo>
+                  <a:pt x="469132" y="761744"/>
+                  <a:pt x="450595" y="772815"/>
+                  <a:pt x="430612" y="780177"/>
+                </a:cubicBezTo>
+                <a:cubicBezTo>
+                  <a:pt x="361532" y="805627"/>
+                  <a:pt x="334658" y="812386"/>
+                  <a:pt x="271221" y="830511"/>
+                </a:cubicBezTo>
+                <a:cubicBezTo>
+                  <a:pt x="260036" y="838900"/>
+                  <a:pt x="249742" y="848633"/>
+                  <a:pt x="237665" y="855678"/>
+                </a:cubicBezTo>
+                <a:cubicBezTo>
+                  <a:pt x="216061" y="868280"/>
+                  <a:pt x="170553" y="889233"/>
+                  <a:pt x="170553" y="889233"/>
+                </a:cubicBezTo>
+                <a:cubicBezTo>
+                  <a:pt x="162164" y="897622"/>
+                  <a:pt x="152670" y="905035"/>
+                  <a:pt x="145386" y="914400"/>
+                </a:cubicBezTo>
+                <a:cubicBezTo>
+                  <a:pt x="133006" y="930317"/>
+                  <a:pt x="111830" y="964734"/>
+                  <a:pt x="111830" y="964734"/>
+                </a:cubicBezTo>
+                <a:cubicBezTo>
+                  <a:pt x="209019" y="1013328"/>
+                  <a:pt x="141292" y="986194"/>
+                  <a:pt x="363500" y="973123"/>
+                </a:cubicBezTo>
+                <a:cubicBezTo>
+                  <a:pt x="374297" y="972488"/>
+                  <a:pt x="474894" y="958971"/>
+                  <a:pt x="489335" y="956345"/>
+                </a:cubicBezTo>
+                <a:cubicBezTo>
+                  <a:pt x="544158" y="946377"/>
+                  <a:pt x="502391" y="947893"/>
+                  <a:pt x="564836" y="939567"/>
+                </a:cubicBezTo>
+                <a:cubicBezTo>
+                  <a:pt x="592692" y="935853"/>
+                  <a:pt x="620763" y="933974"/>
+                  <a:pt x="648726" y="931178"/>
+                </a:cubicBezTo>
+                <a:cubicBezTo>
+                  <a:pt x="659911" y="933974"/>
+                  <a:pt x="688677" y="929974"/>
+                  <a:pt x="682282" y="939567"/>
+                </a:cubicBezTo>
+                <a:cubicBezTo>
+                  <a:pt x="672472" y="954282"/>
+                  <a:pt x="647766" y="948436"/>
+                  <a:pt x="631948" y="956345"/>
+                </a:cubicBezTo>
+                <a:cubicBezTo>
+                  <a:pt x="613912" y="965363"/>
+                  <a:pt x="598626" y="979075"/>
+                  <a:pt x="581614" y="989901"/>
+                </a:cubicBezTo>
+                <a:cubicBezTo>
+                  <a:pt x="567858" y="998655"/>
+                  <a:pt x="539669" y="1015068"/>
+                  <a:pt x="539669" y="1015068"/>
+                </a:cubicBezTo>
+                <a:cubicBezTo>
+                  <a:pt x="496058" y="1073216"/>
+                  <a:pt x="531294" y="1034633"/>
+                  <a:pt x="447390" y="1090569"/>
+                </a:cubicBezTo>
+                <a:cubicBezTo>
+                  <a:pt x="365569" y="1145117"/>
+                  <a:pt x="492722" y="1059676"/>
+                  <a:pt x="388667" y="1132514"/>
+                </a:cubicBezTo>
+                <a:cubicBezTo>
+                  <a:pt x="372147" y="1144078"/>
+                  <a:pt x="356369" y="1157052"/>
+                  <a:pt x="338333" y="1166070"/>
+                </a:cubicBezTo>
+                <a:cubicBezTo>
+                  <a:pt x="327148" y="1171663"/>
+                  <a:pt x="314953" y="1175579"/>
+                  <a:pt x="304777" y="1182848"/>
+                </a:cubicBezTo>
+                <a:cubicBezTo>
+                  <a:pt x="295123" y="1189744"/>
+                  <a:pt x="288724" y="1200420"/>
+                  <a:pt x="279610" y="1208015"/>
+                </a:cubicBezTo>
+                <a:cubicBezTo>
+                  <a:pt x="254736" y="1228743"/>
+                  <a:pt x="250191" y="1223989"/>
+                  <a:pt x="220887" y="1241571"/>
+                </a:cubicBezTo>
+                <a:cubicBezTo>
+                  <a:pt x="203596" y="1251946"/>
+                  <a:pt x="187331" y="1263942"/>
+                  <a:pt x="170553" y="1275127"/>
+                </a:cubicBezTo>
+                <a:lnTo>
+                  <a:pt x="145386" y="1291905"/>
+                </a:lnTo>
+                <a:cubicBezTo>
+                  <a:pt x="159368" y="1294701"/>
+                  <a:pt x="173072" y="1300294"/>
+                  <a:pt x="187331" y="1300294"/>
+                </a:cubicBezTo>
+                <a:cubicBezTo>
+                  <a:pt x="196174" y="1300294"/>
+                  <a:pt x="203919" y="1294050"/>
+                  <a:pt x="212498" y="1291905"/>
+                </a:cubicBezTo>
+                <a:cubicBezTo>
+                  <a:pt x="248692" y="1282857"/>
+                  <a:pt x="284716" y="1272632"/>
+                  <a:pt x="321555" y="1266738"/>
+                </a:cubicBezTo>
+                <a:cubicBezTo>
+                  <a:pt x="354804" y="1261418"/>
+                  <a:pt x="388757" y="1262067"/>
+                  <a:pt x="422223" y="1258349"/>
+                </a:cubicBezTo>
+                <a:cubicBezTo>
+                  <a:pt x="439128" y="1256471"/>
+                  <a:pt x="455745" y="1252546"/>
+                  <a:pt x="472557" y="1249960"/>
+                </a:cubicBezTo>
+                <a:cubicBezTo>
+                  <a:pt x="492100" y="1246953"/>
+                  <a:pt x="511680" y="1244184"/>
+                  <a:pt x="531280" y="1241571"/>
+                </a:cubicBezTo>
+                <a:cubicBezTo>
+                  <a:pt x="553627" y="1238591"/>
+                  <a:pt x="576109" y="1236610"/>
+                  <a:pt x="598392" y="1233182"/>
+                </a:cubicBezTo>
+                <a:cubicBezTo>
+                  <a:pt x="626082" y="1228922"/>
+                  <a:pt x="647172" y="1223084"/>
+                  <a:pt x="673893" y="1216404"/>
+                </a:cubicBezTo>
+                <a:lnTo>
+                  <a:pt x="757782" y="1224793"/>
+                </a:lnTo>
+                <a:cubicBezTo>
+                  <a:pt x="779686" y="1238483"/>
+                  <a:pt x="716589" y="1274698"/>
+                  <a:pt x="715838" y="1275127"/>
+                </a:cubicBezTo>
+                <a:cubicBezTo>
+                  <a:pt x="704980" y="1281332"/>
+                  <a:pt x="693140" y="1285700"/>
+                  <a:pt x="682282" y="1291905"/>
+                </a:cubicBezTo>
+                <a:cubicBezTo>
+                  <a:pt x="673528" y="1296907"/>
+                  <a:pt x="666133" y="1304174"/>
+                  <a:pt x="657115" y="1308683"/>
+                </a:cubicBezTo>
+                <a:cubicBezTo>
+                  <a:pt x="649206" y="1312638"/>
+                  <a:pt x="639857" y="1313117"/>
+                  <a:pt x="631948" y="1317072"/>
+                </a:cubicBezTo>
+                <a:cubicBezTo>
+                  <a:pt x="622930" y="1321581"/>
+                  <a:pt x="615677" y="1329105"/>
+                  <a:pt x="606781" y="1333850"/>
+                </a:cubicBezTo>
+                <a:cubicBezTo>
+                  <a:pt x="573678" y="1351505"/>
+                  <a:pt x="506113" y="1384184"/>
+                  <a:pt x="506113" y="1384184"/>
+                </a:cubicBezTo>
+                <a:cubicBezTo>
+                  <a:pt x="475353" y="1430324"/>
+                  <a:pt x="506113" y="1391175"/>
+                  <a:pt x="464168" y="1426129"/>
+                </a:cubicBezTo>
+                <a:cubicBezTo>
+                  <a:pt x="455054" y="1433724"/>
+                  <a:pt x="448115" y="1443701"/>
+                  <a:pt x="439001" y="1451296"/>
+                </a:cubicBezTo>
+                <a:cubicBezTo>
+                  <a:pt x="402938" y="1481348"/>
+                  <a:pt x="426502" y="1457546"/>
+                  <a:pt x="388667" y="1476463"/>
+                </a:cubicBezTo>
+                <a:cubicBezTo>
+                  <a:pt x="330733" y="1505430"/>
+                  <a:pt x="399781" y="1484171"/>
+                  <a:pt x="329944" y="1501630"/>
+                </a:cubicBezTo>
+                <a:cubicBezTo>
+                  <a:pt x="292455" y="1526623"/>
+                  <a:pt x="289880" y="1534716"/>
+                  <a:pt x="254443" y="1543575"/>
+                </a:cubicBezTo>
+                <a:cubicBezTo>
+                  <a:pt x="240610" y="1547033"/>
+                  <a:pt x="226480" y="1549168"/>
+                  <a:pt x="212498" y="1551964"/>
+                </a:cubicBezTo>
+                <a:cubicBezTo>
+                  <a:pt x="140373" y="1600047"/>
+                  <a:pt x="231628" y="1542399"/>
+                  <a:pt x="162164" y="1577131"/>
+                </a:cubicBezTo>
+                <a:cubicBezTo>
+                  <a:pt x="153146" y="1581640"/>
+                  <a:pt x="127110" y="1591932"/>
+                  <a:pt x="136997" y="1593909"/>
+                </a:cubicBezTo>
+                <a:cubicBezTo>
+                  <a:pt x="159104" y="1598330"/>
+                  <a:pt x="181791" y="1588708"/>
+                  <a:pt x="204109" y="1585520"/>
+                </a:cubicBezTo>
+                <a:cubicBezTo>
+                  <a:pt x="221561" y="1583027"/>
+                  <a:pt x="277118" y="1573559"/>
+                  <a:pt x="296388" y="1568742"/>
+                </a:cubicBezTo>
+                <a:cubicBezTo>
+                  <a:pt x="304967" y="1566597"/>
+                  <a:pt x="312801" y="1561604"/>
+                  <a:pt x="321555" y="1560353"/>
+                </a:cubicBezTo>
+                <a:cubicBezTo>
+                  <a:pt x="352131" y="1555985"/>
+                  <a:pt x="383231" y="1556137"/>
+                  <a:pt x="413834" y="1551964"/>
+                </a:cubicBezTo>
+                <a:cubicBezTo>
+                  <a:pt x="444811" y="1547740"/>
+                  <a:pt x="475232" y="1540062"/>
+                  <a:pt x="506113" y="1535186"/>
+                </a:cubicBezTo>
+                <a:cubicBezTo>
+                  <a:pt x="528382" y="1531670"/>
+                  <a:pt x="550907" y="1529985"/>
+                  <a:pt x="573225" y="1526797"/>
+                </a:cubicBezTo>
+                <a:cubicBezTo>
+                  <a:pt x="590063" y="1524392"/>
+                  <a:pt x="606781" y="1521204"/>
+                  <a:pt x="623559" y="1518408"/>
+                </a:cubicBezTo>
+                <a:cubicBezTo>
+                  <a:pt x="629152" y="1526797"/>
+                  <a:pt x="644846" y="1534557"/>
+                  <a:pt x="640337" y="1543575"/>
+                </a:cubicBezTo>
+                <a:cubicBezTo>
+                  <a:pt x="633045" y="1558159"/>
+                  <a:pt x="611436" y="1558959"/>
+                  <a:pt x="598392" y="1568742"/>
+                </a:cubicBezTo>
+                <a:cubicBezTo>
+                  <a:pt x="588901" y="1575860"/>
+                  <a:pt x="582339" y="1586314"/>
+                  <a:pt x="573225" y="1593909"/>
+                </a:cubicBezTo>
+                <a:cubicBezTo>
+                  <a:pt x="565480" y="1600364"/>
+                  <a:pt x="556262" y="1604827"/>
+                  <a:pt x="548058" y="1610687"/>
+                </a:cubicBezTo>
+                <a:cubicBezTo>
+                  <a:pt x="536681" y="1618814"/>
+                  <a:pt x="527008" y="1629601"/>
+                  <a:pt x="514502" y="1635854"/>
+                </a:cubicBezTo>
+                <a:cubicBezTo>
+                  <a:pt x="504190" y="1641010"/>
+                  <a:pt x="492032" y="1641076"/>
+                  <a:pt x="480946" y="1644243"/>
+                </a:cubicBezTo>
+                <a:cubicBezTo>
+                  <a:pt x="472443" y="1646672"/>
+                  <a:pt x="463688" y="1648677"/>
+                  <a:pt x="455779" y="1652632"/>
+                </a:cubicBezTo>
+                <a:cubicBezTo>
+                  <a:pt x="441195" y="1659924"/>
+                  <a:pt x="427401" y="1668754"/>
+                  <a:pt x="413834" y="1677799"/>
+                </a:cubicBezTo>
+                <a:cubicBezTo>
+                  <a:pt x="385433" y="1696733"/>
+                  <a:pt x="362326" y="1725728"/>
+                  <a:pt x="329944" y="1736522"/>
+                </a:cubicBezTo>
+                <a:cubicBezTo>
+                  <a:pt x="304777" y="1744911"/>
+                  <a:pt x="276516" y="1746974"/>
+                  <a:pt x="254443" y="1761689"/>
+                </a:cubicBezTo>
+                <a:cubicBezTo>
+                  <a:pt x="246054" y="1767282"/>
+                  <a:pt x="237022" y="1772013"/>
+                  <a:pt x="229276" y="1778467"/>
+                </a:cubicBezTo>
+                <a:cubicBezTo>
+                  <a:pt x="220162" y="1786062"/>
+                  <a:pt x="213980" y="1797052"/>
+                  <a:pt x="204109" y="1803633"/>
+                </a:cubicBezTo>
+                <a:cubicBezTo>
+                  <a:pt x="196751" y="1808538"/>
+                  <a:pt x="187331" y="1809226"/>
+                  <a:pt x="178942" y="1812022"/>
+                </a:cubicBezTo>
+                <a:cubicBezTo>
+                  <a:pt x="173349" y="1820411"/>
+                  <a:pt x="169293" y="1830060"/>
+                  <a:pt x="162164" y="1837189"/>
+                </a:cubicBezTo>
+                <a:cubicBezTo>
+                  <a:pt x="155035" y="1844318"/>
+                  <a:pt x="140741" y="1844606"/>
+                  <a:pt x="136997" y="1853967"/>
+                </a:cubicBezTo>
+                <a:cubicBezTo>
+                  <a:pt x="133713" y="1862177"/>
+                  <a:pt x="142590" y="1870745"/>
+                  <a:pt x="145386" y="1879134"/>
+                </a:cubicBezTo>
+                <a:cubicBezTo>
+                  <a:pt x="164960" y="1876338"/>
+                  <a:pt x="184720" y="1874623"/>
+                  <a:pt x="204109" y="1870745"/>
+                </a:cubicBezTo>
+                <a:cubicBezTo>
+                  <a:pt x="212780" y="1869011"/>
+                  <a:pt x="220576" y="1863938"/>
+                  <a:pt x="229276" y="1862356"/>
+                </a:cubicBezTo>
+                <a:cubicBezTo>
+                  <a:pt x="251457" y="1858323"/>
+                  <a:pt x="274150" y="1857673"/>
+                  <a:pt x="296388" y="1853967"/>
+                </a:cubicBezTo>
+                <a:cubicBezTo>
+                  <a:pt x="347315" y="1845479"/>
+                  <a:pt x="317289" y="1841533"/>
+                  <a:pt x="380278" y="1837189"/>
+                </a:cubicBezTo>
+                <a:cubicBezTo>
+                  <a:pt x="444502" y="1832760"/>
+                  <a:pt x="508909" y="1831596"/>
+                  <a:pt x="573225" y="1828800"/>
+                </a:cubicBezTo>
+                <a:cubicBezTo>
+                  <a:pt x="596392" y="1821078"/>
+                  <a:pt x="664120" y="1794595"/>
+                  <a:pt x="673893" y="1828800"/>
+                </a:cubicBezTo>
+                <a:cubicBezTo>
+                  <a:pt x="687204" y="1875388"/>
+                  <a:pt x="594623" y="1881282"/>
+                  <a:pt x="573225" y="1887523"/>
+                </a:cubicBezTo>
+                <a:cubicBezTo>
+                  <a:pt x="519737" y="1903124"/>
+                  <a:pt x="467887" y="1924344"/>
+                  <a:pt x="413834" y="1937857"/>
+                </a:cubicBezTo>
+                <a:cubicBezTo>
+                  <a:pt x="380278" y="1946246"/>
+                  <a:pt x="346493" y="1953767"/>
+                  <a:pt x="313166" y="1963024"/>
+                </a:cubicBezTo>
+                <a:cubicBezTo>
+                  <a:pt x="296126" y="1967757"/>
+                  <a:pt x="277547" y="1969992"/>
+                  <a:pt x="262832" y="1979802"/>
+                </a:cubicBezTo>
+                <a:cubicBezTo>
+                  <a:pt x="205140" y="2018263"/>
+                  <a:pt x="231628" y="2006981"/>
+                  <a:pt x="187331" y="2021747"/>
+                </a:cubicBezTo>
+                <a:cubicBezTo>
+                  <a:pt x="406631" y="2109467"/>
+                  <a:pt x="172137" y="2021467"/>
+                  <a:pt x="791338" y="2046914"/>
+                </a:cubicBezTo>
+                <a:cubicBezTo>
+                  <a:pt x="809009" y="2047640"/>
+                  <a:pt x="823986" y="2063692"/>
+                  <a:pt x="841672" y="2063692"/>
+                </a:cubicBezTo>
+                <a:lnTo>
+                  <a:pt x="850061" y="2063692"/>
+                </a:lnTo>
+              </a:path>
+            </a:pathLst>
+          </a:custGeom>
+          <a:noFill/>
+        </p:spPr>
+        <p:style>
+          <a:lnRef idx="2">
+            <a:schemeClr val="accent1">
+              <a:shade val="50000"/>
+            </a:schemeClr>
+          </a:lnRef>
+          <a:fillRef idx="1">
+            <a:schemeClr val="accent1"/>
+          </a:fillRef>
+          <a:effectRef idx="0">
+            <a:schemeClr val="accent1"/>
+          </a:effectRef>
+          <a:fontRef idx="minor">
+            <a:schemeClr val="lt1"/>
+          </a:fontRef>
+        </p:style>
+        <p:txBody>
+          <a:bodyPr rtlCol="0" anchor="ctr"/>
+          <a:lstStyle/>
+          <a:p>
+            <a:pPr algn="ctr"/>
+            <a:endParaRPr lang="en-US"/>
+          </a:p>
+        </p:txBody>
+      </p:sp>
+      <p:sp>
+        <p:nvSpPr>
+          <p:cNvPr id="13" name="TextBox 12">
+            <a:extLst>
+              <a:ext uri="{FF2B5EF4-FFF2-40B4-BE49-F238E27FC236}">
+                <a16:creationId xmlns:a16="http://schemas.microsoft.com/office/drawing/2014/main" id="{63D8F489-9855-42C1-91BC-753A430BF0DF}"/>
+              </a:ext>
+            </a:extLst>
+          </p:cNvPr>
+          <p:cNvSpPr txBox="1"/>
+          <p:nvPr/>
+        </p:nvSpPr>
+        <p:spPr>
+          <a:xfrm>
+            <a:off x="724560" y="1685835"/>
+            <a:ext cx="3784126" cy="1200329"/>
+          </a:xfrm>
+          <a:prstGeom prst="rect">
+            <a:avLst/>
+          </a:prstGeom>
+          <a:noFill/>
+        </p:spPr>
+        <p:txBody>
+          <a:bodyPr wrap="square" rtlCol="0">
+            <a:spAutoFit/>
+          </a:bodyPr>
+          <a:lstStyle/>
+          <a:p>
+            <a:r>
+              <a:rPr lang="en-US" dirty="0"/>
+              <a:t>Performance Factor is a measure of how the session compares to a hypothetical session that follows the mean of the rate data.</a:t>
             </a:r>
           </a:p>
         </p:txBody>
@@ -14981,6 +16390,122 @@
     <p:extLst>
       <p:ext uri="{BB962C8B-B14F-4D97-AF65-F5344CB8AC3E}">
         <p14:creationId xmlns:p14="http://schemas.microsoft.com/office/powerpoint/2010/main" val="2063002891"/>
+      </p:ext>
+    </p:extLst>
+  </p:cSld>
+  <p:clrMapOvr>
+    <a:masterClrMapping/>
+  </p:clrMapOvr>
+</p:sld>
+</file>
+
+<file path=ppt/slides/slide26.xml><?xml version="1.0" encoding="utf-8"?>
+<p:sld xmlns:a="http://schemas.openxmlformats.org/drawingml/2006/main" xmlns:r="http://schemas.openxmlformats.org/officeDocument/2006/relationships" xmlns:p="http://schemas.openxmlformats.org/presentationml/2006/main">
+  <p:cSld>
+    <p:spTree>
+      <p:nvGrpSpPr>
+        <p:cNvPr id="1" name=""/>
+        <p:cNvGrpSpPr/>
+        <p:nvPr/>
+      </p:nvGrpSpPr>
+      <p:grpSpPr>
+        <a:xfrm>
+          <a:off x="0" y="0"/>
+          <a:ext cx="0" cy="0"/>
+          <a:chOff x="0" y="0"/>
+          <a:chExt cx="0" cy="0"/>
+        </a:xfrm>
+      </p:grpSpPr>
+      <p:sp>
+        <p:nvSpPr>
+          <p:cNvPr id="2" name="Title 1">
+            <a:extLst>
+              <a:ext uri="{FF2B5EF4-FFF2-40B4-BE49-F238E27FC236}">
+                <a16:creationId xmlns:a16="http://schemas.microsoft.com/office/drawing/2014/main" id="{408F25BB-5B09-4017-935F-6BB70124C2EF}"/>
+              </a:ext>
+            </a:extLst>
+          </p:cNvPr>
+          <p:cNvSpPr>
+            <a:spLocks noGrp="1"/>
+          </p:cNvSpPr>
+          <p:nvPr>
+            <p:ph type="title"/>
+          </p:nvPr>
+        </p:nvSpPr>
+        <p:spPr/>
+        <p:txBody>
+          <a:bodyPr/>
+          <a:lstStyle/>
+          <a:p>
+            <a:r>
+              <a:rPr lang="en-US" dirty="0"/>
+              <a:t>Moving Forward</a:t>
+            </a:r>
+          </a:p>
+        </p:txBody>
+      </p:sp>
+      <p:sp>
+        <p:nvSpPr>
+          <p:cNvPr id="3" name="Content Placeholder 2">
+            <a:extLst>
+              <a:ext uri="{FF2B5EF4-FFF2-40B4-BE49-F238E27FC236}">
+                <a16:creationId xmlns:a16="http://schemas.microsoft.com/office/drawing/2014/main" id="{EB1D3B27-D396-4C58-946F-BE225D066C17}"/>
+              </a:ext>
+            </a:extLst>
+          </p:cNvPr>
+          <p:cNvSpPr>
+            <a:spLocks noGrp="1"/>
+          </p:cNvSpPr>
+          <p:nvPr>
+            <p:ph idx="1"/>
+          </p:nvPr>
+        </p:nvSpPr>
+        <p:spPr>
+          <a:xfrm>
+            <a:off x="838200" y="1825625"/>
+            <a:ext cx="10515600" cy="4351338"/>
+          </a:xfrm>
+        </p:spPr>
+        <p:txBody>
+          <a:bodyPr/>
+          <a:lstStyle/>
+          <a:p>
+            <a:r>
+              <a:rPr lang="en-US" dirty="0"/>
+              <a:t>Final documentation</a:t>
+            </a:r>
+          </a:p>
+          <a:p>
+            <a:r>
+              <a:rPr lang="en-US" dirty="0" err="1"/>
+              <a:t>mySQL</a:t>
+            </a:r>
+            <a:r>
+              <a:rPr lang="en-US" dirty="0"/>
+              <a:t> server update 5.1 to 5.5</a:t>
+            </a:r>
+          </a:p>
+          <a:p>
+            <a:r>
+              <a:rPr lang="en-US" dirty="0"/>
+              <a:t>Down to 2 sig fig</a:t>
+            </a:r>
+          </a:p>
+          <a:p>
+            <a:r>
+              <a:rPr lang="en-US" dirty="0"/>
+              <a:t>Rates per hour, min, sec</a:t>
+            </a:r>
+          </a:p>
+          <a:p>
+            <a:endParaRPr lang="en-US" dirty="0"/>
+          </a:p>
+        </p:txBody>
+      </p:sp>
+    </p:spTree>
+    <p:extLst>
+      <p:ext uri="{BB962C8B-B14F-4D97-AF65-F5344CB8AC3E}">
+        <p14:creationId xmlns:p14="http://schemas.microsoft.com/office/powerpoint/2010/main" val="2943116899"/>
       </p:ext>
     </p:extLst>
   </p:cSld>

</xml_diff>